<commit_message>
Updated feature or fixed bug
</commit_message>
<xml_diff>
--- a/ppt/PPT FINAL A16.pptx
+++ b/ppt/PPT FINAL A16.pptx
@@ -292,14 +292,6 @@
 </p:cmAuthorLst>
 </file>
 
-<file path=ppt/revisionInfo.xml><?xml version="1.0" encoding="utf-8"?>
-<p1510:revInfo xmlns:a="http://schemas.openxmlformats.org/drawingml/2006/main" xmlns:r="http://schemas.openxmlformats.org/officeDocument/2006/relationships" xmlns:p1510="http://schemas.microsoft.com/office/powerpoint/2015/10/main">
-  <p1510:revLst>
-    <p1510:client id="{F8EC740F-703C-4BAA-B2FE-6BF03845BD7E}" v="10" dt="2024-11-24T10:58:27.470"/>
-  </p1510:revLst>
-</p1510:revInfo>
-</file>
-
 <file path=ppt/notesMasters/notesMaster1.xml><?xml version="1.0" encoding="utf-8"?>
 <p:notesMaster xmlns:a="http://schemas.openxmlformats.org/drawingml/2006/main" xmlns:r="http://schemas.openxmlformats.org/officeDocument/2006/relationships" xmlns:p="http://schemas.openxmlformats.org/presentationml/2006/main">
   <p:cSld>
@@ -4371,7 +4363,7 @@
                 <a:cs typeface="Times New Roman"/>
                 <a:sym typeface="Times New Roman"/>
               </a:rPr>
-              <a:t>Team Details:                                          </a:t>
+              <a:t>TEAM DETAILS :                                          </a:t>
             </a:r>
             <a:endParaRPr sz="9600" b="1" u="sng" dirty="0">
               <a:solidFill>
@@ -4452,7 +4444,7 @@
                 <a:cs typeface="Times New Roman"/>
                 <a:sym typeface="Times New Roman"/>
               </a:rPr>
-              <a:t>: ANISHA N/211423104042, ANILITTY LD/211423104040</a:t>
+              <a:t>: ANISHA N/211423104042, </a:t>
             </a:r>
           </a:p>
           <a:p>
@@ -4468,15 +4460,18 @@
               </a:buClr>
               <a:buSzPct val="100000"/>
             </a:pPr>
-            <a:endParaRPr lang="en-IN" sz="9600" b="1" dirty="0">
-              <a:solidFill>
-                <a:srgbClr val="54045C"/>
-              </a:solidFill>
-              <a:latin typeface="Times New Roman"/>
-              <a:ea typeface="Times New Roman"/>
-              <a:cs typeface="Times New Roman"/>
-              <a:sym typeface="Times New Roman"/>
-            </a:endParaRPr>
+            <a:r>
+              <a:rPr lang="en-IN" sz="9600" b="1" dirty="0">
+                <a:solidFill>
+                  <a:srgbClr val="54045C"/>
+                </a:solidFill>
+                <a:latin typeface="Times New Roman"/>
+                <a:ea typeface="Times New Roman"/>
+                <a:cs typeface="Times New Roman"/>
+                <a:sym typeface="Times New Roman"/>
+              </a:rPr>
+              <a:t>	  ANILITTY LD/211423104040</a:t>
+            </a:r>
           </a:p>
           <a:p>
             <a:pPr marL="0" lvl="0" indent="0" algn="l" rtl="0">
@@ -4517,7 +4512,7 @@
                 <a:cs typeface="Times New Roman"/>
                 <a:sym typeface="Times New Roman"/>
               </a:rPr>
-              <a:t>Batch Number:A16	                      	Domain: FULL STACK DEVELOPMENT</a:t>
+              <a:t>Batch Number: A16	                      	Domain: FULL STACK DEVELOPMENT</a:t>
             </a:r>
             <a:endParaRPr lang="en-IN" sz="9600" b="1" dirty="0">
               <a:solidFill>
@@ -4527,6 +4522,73 @@
               <a:ea typeface="Times New Roman"/>
               <a:cs typeface="Times New Roman"/>
               <a:sym typeface="Times New Roman"/>
+            </a:endParaRPr>
+          </a:p>
+          <a:p>
+            <a:pPr algn="l">
+              <a:lnSpc>
+                <a:spcPct val="150000"/>
+              </a:lnSpc>
+              <a:spcBef>
+                <a:spcPts val="0"/>
+              </a:spcBef>
+              <a:buClr>
+                <a:srgbClr val="54045C"/>
+              </a:buClr>
+              <a:buSzPct val="100000"/>
+            </a:pPr>
+            <a:r>
+              <a:rPr lang="en-IN" sz="9600" b="1" dirty="0">
+                <a:solidFill>
+                  <a:srgbClr val="54045C"/>
+                </a:solidFill>
+                <a:latin typeface="Times New Roman"/>
+                <a:ea typeface="Times New Roman"/>
+                <a:cs typeface="Times New Roman"/>
+              </a:rPr>
+              <a:t> </a:t>
+            </a:r>
+            <a:r>
+              <a:rPr lang="en-GB" sz="9600" b="1" dirty="0">
+                <a:solidFill>
+                  <a:srgbClr val="54045C"/>
+                </a:solidFill>
+                <a:latin typeface="Times New Roman"/>
+                <a:ea typeface="Times New Roman"/>
+                <a:cs typeface="Times New Roman"/>
+                <a:sym typeface="Times New Roman"/>
+              </a:rPr>
+              <a:t>Date: 29/10/2025</a:t>
+            </a:r>
+            <a:r>
+              <a:rPr lang="en-IN" sz="9600" b="1" dirty="0">
+                <a:solidFill>
+                  <a:srgbClr val="54045C"/>
+                </a:solidFill>
+                <a:latin typeface="Times New Roman"/>
+                <a:ea typeface="Times New Roman"/>
+                <a:cs typeface="Times New Roman"/>
+              </a:rPr>
+              <a:t>                          </a:t>
+            </a:r>
+            <a:r>
+              <a:rPr lang="en-GB" sz="9600" b="1">
+                <a:solidFill>
+                  <a:srgbClr val="54045C"/>
+                </a:solidFill>
+                <a:latin typeface="Times New Roman"/>
+                <a:ea typeface="Times New Roman"/>
+                <a:cs typeface="Times New Roman"/>
+              </a:rPr>
+              <a:t>	COORDINATOR NAME &amp; DESTINATION</a:t>
+            </a:r>
+            <a:endParaRPr lang="en-GB" sz="9500" b="1" dirty="0">
+              <a:solidFill>
+                <a:srgbClr val="54045C"/>
+              </a:solidFill>
+              <a:latin typeface="Times New Roman"/>
+              <a:ea typeface="Times New Roman"/>
+              <a:cs typeface="Times New Roman"/>
             </a:endParaRPr>
           </a:p>
           <a:p>
@@ -4542,14 +4604,17 @@
               </a:buClr>
               <a:buSzPct val="100000"/>
             </a:pPr>
-            <a:endParaRPr lang="en-IN" sz="9600" b="1" dirty="0">
-              <a:solidFill>
-                <a:srgbClr val="54045C"/>
-              </a:solidFill>
-              <a:latin typeface="Times New Roman"/>
-              <a:ea typeface="Times New Roman"/>
-              <a:cs typeface="Times New Roman"/>
-            </a:endParaRPr>
+            <a:r>
+              <a:rPr lang="en-GB" sz="9500" b="1" dirty="0">
+                <a:solidFill>
+                  <a:srgbClr val="54045C"/>
+                </a:solidFill>
+                <a:latin typeface="Times New Roman"/>
+                <a:ea typeface="Times New Roman"/>
+                <a:cs typeface="Times New Roman"/>
+              </a:rPr>
+              <a:t> 					Dr. KAVITHA SUBRAMANI ME., Ph.D., </a:t>
+            </a:r>
           </a:p>
           <a:p>
             <a:pPr lvl="0" algn="l">
@@ -4565,28 +4630,6 @@
               <a:buSzPct val="100000"/>
             </a:pPr>
             <a:r>
-              <a:rPr lang="en-IN" sz="9600" b="1" dirty="0">
-                <a:solidFill>
-                  <a:srgbClr val="54045C"/>
-                </a:solidFill>
-                <a:latin typeface="Times New Roman"/>
-                <a:ea typeface="Times New Roman"/>
-                <a:cs typeface="Times New Roman"/>
-              </a:rPr>
-              <a:t>Guide Name &amp; Designation</a:t>
-            </a:r>
-            <a:r>
-              <a:rPr lang="en-GB" sz="9600" b="1" dirty="0">
-                <a:solidFill>
-                  <a:srgbClr val="54045C"/>
-                </a:solidFill>
-                <a:latin typeface="Times New Roman"/>
-                <a:ea typeface="Times New Roman"/>
-                <a:cs typeface="Times New Roman"/>
-              </a:rPr>
-              <a:t>			Co</a:t>
-            </a:r>
-            <a:r>
               <a:rPr lang="en-GB" sz="9500" b="1" dirty="0">
                 <a:solidFill>
                   <a:srgbClr val="54045C"/>
@@ -4595,90 +4638,8 @@
                 <a:ea typeface="Times New Roman"/>
                 <a:cs typeface="Times New Roman"/>
               </a:rPr>
-              <a:t>ordinator Name &amp; Designation</a:t>
-            </a:r>
-          </a:p>
-          <a:p>
-            <a:pPr lvl="0" algn="l">
-              <a:lnSpc>
-                <a:spcPct val="150000"/>
-              </a:lnSpc>
-              <a:spcBef>
-                <a:spcPts val="0"/>
-              </a:spcBef>
-              <a:buClr>
-                <a:srgbClr val="54045C"/>
-              </a:buClr>
-              <a:buSzPct val="100000"/>
-            </a:pPr>
-            <a:r>
-              <a:rPr lang="en-GB" sz="9500" b="1" dirty="0">
-                <a:solidFill>
-                  <a:srgbClr val="54045C"/>
-                </a:solidFill>
-                <a:latin typeface="Times New Roman"/>
-                <a:ea typeface="Times New Roman"/>
-                <a:cs typeface="Times New Roman"/>
-              </a:rPr>
-              <a:t> 						</a:t>
-            </a:r>
-            <a:r>
-              <a:rPr lang="en-GB" sz="9500" b="1" dirty="0" err="1">
-                <a:solidFill>
-                  <a:srgbClr val="54045C"/>
-                </a:solidFill>
-                <a:latin typeface="Times New Roman"/>
-                <a:ea typeface="Times New Roman"/>
-                <a:cs typeface="Times New Roman"/>
-              </a:rPr>
-              <a:t>Dr.KAVITHA</a:t>
-            </a:r>
-            <a:r>
-              <a:rPr lang="en-GB" sz="9500" b="1" dirty="0">
-                <a:solidFill>
-                  <a:srgbClr val="54045C"/>
-                </a:solidFill>
-                <a:latin typeface="Times New Roman"/>
-                <a:ea typeface="Times New Roman"/>
-                <a:cs typeface="Times New Roman"/>
-              </a:rPr>
-              <a:t> SUBRAMANI </a:t>
-            </a:r>
-          </a:p>
-          <a:p>
-            <a:pPr lvl="0" algn="l">
-              <a:lnSpc>
-                <a:spcPct val="150000"/>
-              </a:lnSpc>
-              <a:spcBef>
-                <a:spcPts val="0"/>
-              </a:spcBef>
-              <a:buClr>
-                <a:srgbClr val="54045C"/>
-              </a:buClr>
-              <a:buSzPct val="100000"/>
-            </a:pPr>
-            <a:r>
-              <a:rPr lang="en-GB" sz="9500" b="1" dirty="0">
-                <a:solidFill>
-                  <a:srgbClr val="54045C"/>
-                </a:solidFill>
-                <a:latin typeface="Times New Roman"/>
-                <a:ea typeface="Times New Roman"/>
-                <a:cs typeface="Times New Roman"/>
-                <a:sym typeface="Times New Roman"/>
-              </a:rPr>
-              <a:t>Date:</a:t>
-            </a:r>
-            <a:endParaRPr sz="9500" b="1" dirty="0">
-              <a:solidFill>
-                <a:srgbClr val="54045C"/>
-              </a:solidFill>
-              <a:latin typeface="Times New Roman"/>
-              <a:ea typeface="Times New Roman"/>
-              <a:cs typeface="Times New Roman"/>
-              <a:sym typeface="Times New Roman"/>
-            </a:endParaRPr>
+              <a:t>                                                            PROFESSOR</a:t>
+            </a:r>
           </a:p>
           <a:p>
             <a:pPr marL="0" lvl="0" indent="0" algn="ctr" rtl="0">

</xml_diff>